<commit_message>
Adicionei um sorriso no rosto do trabalhador brasileiro
</commit_message>
<xml_diff>
--- a/Diagramacogumelo.pptx
+++ b/Diagramacogumelo.pptx
@@ -243,7 +243,7 @@
           <a:p>
             <a:fld id="{07591210-0E1C-4716-A45D-A8B3FBCECD06}" type="datetimeFigureOut">
               <a:rPr lang="pt-BR" smtClean="0"/>
-              <a:t>05/03/2021</a:t>
+              <a:t>06/03/2021</a:t>
             </a:fld>
             <a:endParaRPr lang="pt-BR"/>
           </a:p>
@@ -413,7 +413,7 @@
           <a:p>
             <a:fld id="{07591210-0E1C-4716-A45D-A8B3FBCECD06}" type="datetimeFigureOut">
               <a:rPr lang="pt-BR" smtClean="0"/>
-              <a:t>05/03/2021</a:t>
+              <a:t>06/03/2021</a:t>
             </a:fld>
             <a:endParaRPr lang="pt-BR"/>
           </a:p>
@@ -593,7 +593,7 @@
           <a:p>
             <a:fld id="{07591210-0E1C-4716-A45D-A8B3FBCECD06}" type="datetimeFigureOut">
               <a:rPr lang="pt-BR" smtClean="0"/>
-              <a:t>05/03/2021</a:t>
+              <a:t>06/03/2021</a:t>
             </a:fld>
             <a:endParaRPr lang="pt-BR"/>
           </a:p>
@@ -763,7 +763,7 @@
           <a:p>
             <a:fld id="{07591210-0E1C-4716-A45D-A8B3FBCECD06}" type="datetimeFigureOut">
               <a:rPr lang="pt-BR" smtClean="0"/>
-              <a:t>05/03/2021</a:t>
+              <a:t>06/03/2021</a:t>
             </a:fld>
             <a:endParaRPr lang="pt-BR"/>
           </a:p>
@@ -1007,7 +1007,7 @@
           <a:p>
             <a:fld id="{07591210-0E1C-4716-A45D-A8B3FBCECD06}" type="datetimeFigureOut">
               <a:rPr lang="pt-BR" smtClean="0"/>
-              <a:t>05/03/2021</a:t>
+              <a:t>06/03/2021</a:t>
             </a:fld>
             <a:endParaRPr lang="pt-BR"/>
           </a:p>
@@ -1239,7 +1239,7 @@
           <a:p>
             <a:fld id="{07591210-0E1C-4716-A45D-A8B3FBCECD06}" type="datetimeFigureOut">
               <a:rPr lang="pt-BR" smtClean="0"/>
-              <a:t>05/03/2021</a:t>
+              <a:t>06/03/2021</a:t>
             </a:fld>
             <a:endParaRPr lang="pt-BR"/>
           </a:p>
@@ -1606,7 +1606,7 @@
           <a:p>
             <a:fld id="{07591210-0E1C-4716-A45D-A8B3FBCECD06}" type="datetimeFigureOut">
               <a:rPr lang="pt-BR" smtClean="0"/>
-              <a:t>05/03/2021</a:t>
+              <a:t>06/03/2021</a:t>
             </a:fld>
             <a:endParaRPr lang="pt-BR"/>
           </a:p>
@@ -1724,7 +1724,7 @@
           <a:p>
             <a:fld id="{07591210-0E1C-4716-A45D-A8B3FBCECD06}" type="datetimeFigureOut">
               <a:rPr lang="pt-BR" smtClean="0"/>
-              <a:t>05/03/2021</a:t>
+              <a:t>06/03/2021</a:t>
             </a:fld>
             <a:endParaRPr lang="pt-BR"/>
           </a:p>
@@ -1819,7 +1819,7 @@
           <a:p>
             <a:fld id="{07591210-0E1C-4716-A45D-A8B3FBCECD06}" type="datetimeFigureOut">
               <a:rPr lang="pt-BR" smtClean="0"/>
-              <a:t>05/03/2021</a:t>
+              <a:t>06/03/2021</a:t>
             </a:fld>
             <a:endParaRPr lang="pt-BR"/>
           </a:p>
@@ -2096,7 +2096,7 @@
           <a:p>
             <a:fld id="{07591210-0E1C-4716-A45D-A8B3FBCECD06}" type="datetimeFigureOut">
               <a:rPr lang="pt-BR" smtClean="0"/>
-              <a:t>05/03/2021</a:t>
+              <a:t>06/03/2021</a:t>
             </a:fld>
             <a:endParaRPr lang="pt-BR"/>
           </a:p>
@@ -2353,7 +2353,7 @@
           <a:p>
             <a:fld id="{07591210-0E1C-4716-A45D-A8B3FBCECD06}" type="datetimeFigureOut">
               <a:rPr lang="pt-BR" smtClean="0"/>
-              <a:t>05/03/2021</a:t>
+              <a:t>06/03/2021</a:t>
             </a:fld>
             <a:endParaRPr lang="pt-BR"/>
           </a:p>
@@ -2566,7 +2566,7 @@
           <a:p>
             <a:fld id="{07591210-0E1C-4716-A45D-A8B3FBCECD06}" type="datetimeFigureOut">
               <a:rPr lang="pt-BR" smtClean="0"/>
-              <a:t>05/03/2021</a:t>
+              <a:t>06/03/2021</a:t>
             </a:fld>
             <a:endParaRPr lang="pt-BR"/>
           </a:p>
@@ -3747,12 +3747,128 @@
           </a:p>
         </p:txBody>
       </p:sp>
+      <p:sp>
+        <p:nvSpPr>
+          <p:cNvPr id="38" name="CaixaDeTexto 37">
+            <a:extLst>
+              <a:ext uri="{FF2B5EF4-FFF2-40B4-BE49-F238E27FC236}">
+                <a16:creationId xmlns:a16="http://schemas.microsoft.com/office/drawing/2014/main" id="{1EFFBFCE-5558-498E-9823-F2294DC3D34E}"/>
+              </a:ext>
+            </a:extLst>
+          </p:cNvPr>
+          <p:cNvSpPr txBox="1"/>
+          <p:nvPr/>
+        </p:nvSpPr>
+        <p:spPr>
+          <a:xfrm>
+            <a:off x="112295" y="6811445"/>
+            <a:ext cx="4838405" cy="584775"/>
+          </a:xfrm>
+          <a:prstGeom prst="rect">
+            <a:avLst/>
+          </a:prstGeom>
+          <a:noFill/>
+        </p:spPr>
+        <p:txBody>
+          <a:bodyPr wrap="square" rtlCol="0">
+            <a:spAutoFit/>
+          </a:bodyPr>
+          <a:lstStyle/>
+          <a:p>
+            <a:pPr marL="285730" indent="-285730">
+              <a:buFont typeface="Wingdings" panose="05000000000000000000" pitchFamily="2" charset="2"/>
+              <a:buChar char="ü"/>
+            </a:pPr>
+            <a:r>
+              <a:rPr lang="pt-BR" sz="1600" dirty="0">
+                <a:latin typeface="Century Gothic" panose="020B0502020202020204" pitchFamily="34" charset="0"/>
+              </a:rPr>
+              <a:t>O agricultor/usuário tem dados precisos sobre a umidade e temperatura da estufa</a:t>
+            </a:r>
+          </a:p>
+        </p:txBody>
+      </p:sp>
+      <p:sp>
+        <p:nvSpPr>
+          <p:cNvPr id="28" name="CaixaDeTexto 27">
+            <a:extLst>
+              <a:ext uri="{FF2B5EF4-FFF2-40B4-BE49-F238E27FC236}">
+                <a16:creationId xmlns:a16="http://schemas.microsoft.com/office/drawing/2014/main" id="{F85BB72D-332E-4B83-BA31-33E3C1D89CB0}"/>
+              </a:ext>
+            </a:extLst>
+          </p:cNvPr>
+          <p:cNvSpPr txBox="1"/>
+          <p:nvPr/>
+        </p:nvSpPr>
+        <p:spPr>
+          <a:xfrm>
+            <a:off x="839484" y="393687"/>
+            <a:ext cx="10801081" cy="769441"/>
+          </a:xfrm>
+          <a:prstGeom prst="rect">
+            <a:avLst/>
+          </a:prstGeom>
+          <a:noFill/>
+        </p:spPr>
+        <p:txBody>
+          <a:bodyPr wrap="square" rtlCol="0">
+            <a:spAutoFit/>
+          </a:bodyPr>
+          <a:lstStyle/>
+          <a:p>
+            <a:pPr algn="ctr"/>
+            <a:r>
+              <a:rPr lang="pt-BR" sz="4400" dirty="0">
+                <a:latin typeface="Century Gothic" panose="020B0502020202020204" pitchFamily="34" charset="0"/>
+              </a:rPr>
+              <a:t>Como o Mushsensor funciona ?</a:t>
+            </a:r>
+          </a:p>
+        </p:txBody>
+      </p:sp>
+      <p:cxnSp>
+        <p:nvCxnSpPr>
+          <p:cNvPr id="31" name="Conector reto 30">
+            <a:extLst>
+              <a:ext uri="{FF2B5EF4-FFF2-40B4-BE49-F238E27FC236}">
+                <a16:creationId xmlns:a16="http://schemas.microsoft.com/office/drawing/2014/main" id="{E1FE98FA-9AA5-494D-A5B7-8D7B3DD9A0E4}"/>
+              </a:ext>
+            </a:extLst>
+          </p:cNvPr>
+          <p:cNvCxnSpPr/>
+          <p:nvPr/>
+        </p:nvCxnSpPr>
+        <p:spPr>
+          <a:xfrm>
+            <a:off x="212188" y="1224690"/>
+            <a:ext cx="9890213" cy="44059"/>
+          </a:xfrm>
+          <a:prstGeom prst="line">
+            <a:avLst/>
+          </a:prstGeom>
+          <a:ln w="28575"/>
+        </p:spPr>
+        <p:style>
+          <a:lnRef idx="3">
+            <a:schemeClr val="accent3"/>
+          </a:lnRef>
+          <a:fillRef idx="0">
+            <a:schemeClr val="accent3"/>
+          </a:fillRef>
+          <a:effectRef idx="2">
+            <a:schemeClr val="accent3"/>
+          </a:effectRef>
+          <a:fontRef idx="minor">
+            <a:schemeClr val="tx1"/>
+          </a:fontRef>
+        </p:style>
+      </p:cxnSp>
       <p:pic>
         <p:nvPicPr>
-          <p:cNvPr id="23" name="Imagem 22">
+          <p:cNvPr id="4" name="Imagem 3">
             <a:extLst>
               <a:ext uri="{FF2B5EF4-FFF2-40B4-BE49-F238E27FC236}">
-                <a16:creationId xmlns:a16="http://schemas.microsoft.com/office/drawing/2014/main" id="{1574D8D3-E274-4231-8A3F-7441FE5800D3}"/>
+                <a16:creationId xmlns:a16="http://schemas.microsoft.com/office/drawing/2014/main" id="{8F09E224-75E5-4A3E-A009-82906B1A292A}"/>
               </a:ext>
             </a:extLst>
           </p:cNvPr>
@@ -3775,130 +3891,14 @@
         </p:blipFill>
         <p:spPr>
           <a:xfrm>
-            <a:off x="1519708" y="4986508"/>
-            <a:ext cx="1420043" cy="1420043"/>
+            <a:off x="1488383" y="4903785"/>
+            <a:ext cx="1448159" cy="1448159"/>
           </a:xfrm>
           <a:prstGeom prst="rect">
             <a:avLst/>
           </a:prstGeom>
         </p:spPr>
       </p:pic>
-      <p:sp>
-        <p:nvSpPr>
-          <p:cNvPr id="38" name="CaixaDeTexto 37">
-            <a:extLst>
-              <a:ext uri="{FF2B5EF4-FFF2-40B4-BE49-F238E27FC236}">
-                <a16:creationId xmlns:a16="http://schemas.microsoft.com/office/drawing/2014/main" id="{1EFFBFCE-5558-498E-9823-F2294DC3D34E}"/>
-              </a:ext>
-            </a:extLst>
-          </p:cNvPr>
-          <p:cNvSpPr txBox="1"/>
-          <p:nvPr/>
-        </p:nvSpPr>
-        <p:spPr>
-          <a:xfrm>
-            <a:off x="112295" y="6811445"/>
-            <a:ext cx="4838405" cy="584775"/>
-          </a:xfrm>
-          <a:prstGeom prst="rect">
-            <a:avLst/>
-          </a:prstGeom>
-          <a:noFill/>
-        </p:spPr>
-        <p:txBody>
-          <a:bodyPr wrap="square" rtlCol="0">
-            <a:spAutoFit/>
-          </a:bodyPr>
-          <a:lstStyle/>
-          <a:p>
-            <a:pPr marL="285730" indent="-285730">
-              <a:buFont typeface="Wingdings" panose="05000000000000000000" pitchFamily="2" charset="2"/>
-              <a:buChar char="ü"/>
-            </a:pPr>
-            <a:r>
-              <a:rPr lang="pt-BR" sz="1600" dirty="0">
-                <a:latin typeface="Century Gothic" panose="020B0502020202020204" pitchFamily="34" charset="0"/>
-              </a:rPr>
-              <a:t>O agricultor/usuário tem dados precisos sobre a umidade e temperatura da estufa</a:t>
-            </a:r>
-          </a:p>
-        </p:txBody>
-      </p:sp>
-      <p:sp>
-        <p:nvSpPr>
-          <p:cNvPr id="28" name="CaixaDeTexto 27">
-            <a:extLst>
-              <a:ext uri="{FF2B5EF4-FFF2-40B4-BE49-F238E27FC236}">
-                <a16:creationId xmlns:a16="http://schemas.microsoft.com/office/drawing/2014/main" id="{F85BB72D-332E-4B83-BA31-33E3C1D89CB0}"/>
-              </a:ext>
-            </a:extLst>
-          </p:cNvPr>
-          <p:cNvSpPr txBox="1"/>
-          <p:nvPr/>
-        </p:nvSpPr>
-        <p:spPr>
-          <a:xfrm>
-            <a:off x="839484" y="393687"/>
-            <a:ext cx="10801081" cy="769441"/>
-          </a:xfrm>
-          <a:prstGeom prst="rect">
-            <a:avLst/>
-          </a:prstGeom>
-          <a:noFill/>
-        </p:spPr>
-        <p:txBody>
-          <a:bodyPr wrap="square" rtlCol="0">
-            <a:spAutoFit/>
-          </a:bodyPr>
-          <a:lstStyle/>
-          <a:p>
-            <a:pPr algn="ctr"/>
-            <a:r>
-              <a:rPr lang="pt-BR" sz="4400" dirty="0">
-                <a:latin typeface="Century Gothic" panose="020B0502020202020204" pitchFamily="34" charset="0"/>
-              </a:rPr>
-              <a:t>Como o Mushsensor funciona ?</a:t>
-            </a:r>
-          </a:p>
-        </p:txBody>
-      </p:sp>
-      <p:cxnSp>
-        <p:nvCxnSpPr>
-          <p:cNvPr id="31" name="Conector reto 30">
-            <a:extLst>
-              <a:ext uri="{FF2B5EF4-FFF2-40B4-BE49-F238E27FC236}">
-                <a16:creationId xmlns:a16="http://schemas.microsoft.com/office/drawing/2014/main" id="{E1FE98FA-9AA5-494D-A5B7-8D7B3DD9A0E4}"/>
-              </a:ext>
-            </a:extLst>
-          </p:cNvPr>
-          <p:cNvCxnSpPr/>
-          <p:nvPr/>
-        </p:nvCxnSpPr>
-        <p:spPr>
-          <a:xfrm>
-            <a:off x="212188" y="1224690"/>
-            <a:ext cx="9890213" cy="44059"/>
-          </a:xfrm>
-          <a:prstGeom prst="line">
-            <a:avLst/>
-          </a:prstGeom>
-          <a:ln w="28575"/>
-        </p:spPr>
-        <p:style>
-          <a:lnRef idx="3">
-            <a:schemeClr val="accent3"/>
-          </a:lnRef>
-          <a:fillRef idx="0">
-            <a:schemeClr val="accent3"/>
-          </a:fillRef>
-          <a:effectRef idx="2">
-            <a:schemeClr val="accent3"/>
-          </a:effectRef>
-          <a:fontRef idx="minor">
-            <a:schemeClr val="tx1"/>
-          </a:fontRef>
-        </p:style>
-      </p:cxnSp>
     </p:spTree>
     <p:extLst>
       <p:ext uri="{BB962C8B-B14F-4D97-AF65-F5344CB8AC3E}">

</xml_diff>